<commit_message>
complete session 1 scripts, add session 2
</commit_message>
<xml_diff>
--- a/session-1/session-1.pptx
+++ b/session-1/session-1.pptx
@@ -3407,13 +3407,12 @@
             </a:r>
           </a:p>
           <a:p>
-            <a:pPr>
-              <a:buFontTx/>
-              <a:buChar char="-"/>
+            <a:pPr marL="0" indent="0">
+              <a:buNone/>
             </a:pPr>
             <a:r>
               <a:rPr lang="en-US" dirty="0"/>
-              <a:t>have downloaded from </a:t>
+              <a:t>- have downloaded from </a:t>
             </a:r>
             <a:r>
               <a:rPr lang="en-US" dirty="0" err="1"/>
@@ -3470,13 +3469,12 @@
             </a:r>
           </a:p>
           <a:p>
-            <a:pPr>
-              <a:buFontTx/>
-              <a:buChar char="-"/>
+            <a:pPr marL="0" indent="0">
+              <a:buNone/>
             </a:pPr>
             <a:r>
               <a:rPr lang="en-US" dirty="0"/>
-              <a:t>Download “Properties (CSV)” from</a:t>
+              <a:t>- Download “Properties (CSV)” from</a:t>
             </a:r>
           </a:p>
           <a:p>
@@ -4835,7 +4833,7 @@
           <a:p>
             <a:r>
               <a:rPr lang="en-US" dirty="0"/>
-              <a:t>What are your goals?</a:t>
+              <a:t>Getting to know you</a:t>
             </a:r>
           </a:p>
         </p:txBody>
@@ -4863,17 +4861,19 @@
           <a:p>
             <a:r>
               <a:rPr lang="en-US" dirty="0"/>
-              <a:t>Where are you now?</a:t>
-            </a:r>
-          </a:p>
-          <a:p>
-            <a:r>
-              <a:rPr lang="en-US" dirty="0"/>
-              <a:t>What would you hope to get out of </a:t>
-            </a:r>
-            <a:r>
-              <a:rPr lang="en-US"/>
-              <a:t>the sessions?</a:t>
+              <a:t>What do you work on?</a:t>
+            </a:r>
+          </a:p>
+          <a:p>
+            <a:r>
+              <a:rPr lang="en-US" dirty="0"/>
+              <a:t>What is your current coding workstream?</a:t>
+            </a:r>
+          </a:p>
+          <a:p>
+            <a:r>
+              <a:rPr lang="en-US" dirty="0"/>
+              <a:t>What would you hope to get out of the sessions?</a:t>
             </a:r>
           </a:p>
         </p:txBody>

</xml_diff>